<commit_message>
Corrections and additions before SQL Sat 971 Oslo
</commit_message>
<xml_diff>
--- a/Statistics an unreliable friend/SQL Saturday 971 Oslo - Statistics an unreliable friend/Statistics_An_Unreliable_Friend_Transmokopter.pptx
+++ b/Statistics an unreliable friend/SQL Saturday 971 Oslo - Statistics an unreliable friend/Statistics_An_Unreliable_Friend_Transmokopter.pptx
@@ -1119,7 +1119,7 @@
           <a:p>
             <a:fld id="{896D3B2D-3924-0B48-B558-93C031AA9A06}" type="datetimeFigureOut">
               <a:rPr lang="en-US" smtClean="0"/>
-              <a:t>8/26/2020</a:t>
+              <a:t>8/28/2020</a:t>
             </a:fld>
             <a:endParaRPr lang="en-US"/>
           </a:p>
@@ -1579,7 +1579,7 @@
             <a:fld id="{B61BEF0D-F0BB-DE4B-95CE-6DB70DBA9567}" type="datetimeFigureOut">
               <a:rPr lang="en-US"/>
               <a:pPr/>
-              <a:t>8/26/2020</a:t>
+              <a:t>8/28/2020</a:t>
             </a:fld>
             <a:endParaRPr lang="en-US"/>
           </a:p>
@@ -1863,7 +1863,7 @@
             <a:fld id="{B61BEF0D-F0BB-DE4B-95CE-6DB70DBA9567}" type="datetimeFigureOut">
               <a:rPr lang="en-US"/>
               <a:pPr/>
-              <a:t>8/26/2020</a:t>
+              <a:t>8/28/2020</a:t>
             </a:fld>
             <a:endParaRPr lang="en-US"/>
           </a:p>
@@ -2174,7 +2174,7 @@
             <a:fld id="{B61BEF0D-F0BB-DE4B-95CE-6DB70DBA9567}" type="datetimeFigureOut">
               <a:rPr lang="en-US"/>
               <a:pPr/>
-              <a:t>8/26/2020</a:t>
+              <a:t>8/28/2020</a:t>
             </a:fld>
             <a:endParaRPr lang="en-US"/>
           </a:p>
@@ -2512,7 +2512,7 @@
             <a:fld id="{B61BEF0D-F0BB-DE4B-95CE-6DB70DBA9567}" type="datetimeFigureOut">
               <a:rPr lang="en-US"/>
               <a:pPr/>
-              <a:t>8/26/2020</a:t>
+              <a:t>8/28/2020</a:t>
             </a:fld>
             <a:endParaRPr lang="en-US"/>
           </a:p>
@@ -2823,7 +2823,7 @@
             <a:fld id="{B61BEF0D-F0BB-DE4B-95CE-6DB70DBA9567}" type="datetimeFigureOut">
               <a:rPr lang="en-US"/>
               <a:pPr/>
-              <a:t>8/26/2020</a:t>
+              <a:t>8/28/2020</a:t>
             </a:fld>
             <a:endParaRPr lang="en-US"/>
           </a:p>
@@ -3213,7 +3213,7 @@
             <a:fld id="{B61BEF0D-F0BB-DE4B-95CE-6DB70DBA9567}" type="datetimeFigureOut">
               <a:rPr lang="en-US"/>
               <a:pPr/>
-              <a:t>8/26/2020</a:t>
+              <a:t>8/28/2020</a:t>
             </a:fld>
             <a:endParaRPr lang="en-US"/>
           </a:p>
@@ -3379,7 +3379,7 @@
           <a:p>
             <a:fld id="{55C6B4A9-1611-4792-9094-5F34BCA07E0B}" type="datetimeFigureOut">
               <a:rPr lang="en-US"/>
-              <a:t>8/26/2020</a:t>
+              <a:t>8/28/2020</a:t>
             </a:fld>
             <a:endParaRPr lang="en-US"/>
           </a:p>
@@ -3555,7 +3555,7 @@
             <a:fld id="{B61BEF0D-F0BB-DE4B-95CE-6DB70DBA9567}" type="datetimeFigureOut">
               <a:rPr lang="en-US"/>
               <a:pPr/>
-              <a:t>8/26/2020</a:t>
+              <a:t>8/28/2020</a:t>
             </a:fld>
             <a:endParaRPr lang="en-US"/>
           </a:p>
@@ -3759,7 +3759,7 @@
           <a:p>
             <a:fld id="{C2231AF4-6FC1-4460-BBC9-D7CD0B6E11EF}" type="datetimeFigureOut">
               <a:rPr lang="sv-SE" smtClean="0"/>
-              <a:t>2020-08-26</a:t>
+              <a:t>2020-08-28</a:t>
             </a:fld>
             <a:endParaRPr lang="sv-SE"/>
           </a:p>
@@ -3957,7 +3957,7 @@
           <a:p>
             <a:fld id="{C2231AF4-6FC1-4460-BBC9-D7CD0B6E11EF}" type="datetimeFigureOut">
               <a:rPr lang="sv-SE" smtClean="0"/>
-              <a:t>2020-08-26</a:t>
+              <a:t>2020-08-28</a:t>
             </a:fld>
             <a:endParaRPr lang="sv-SE"/>
           </a:p>
@@ -4232,7 +4232,7 @@
           <a:p>
             <a:fld id="{C2231AF4-6FC1-4460-BBC9-D7CD0B6E11EF}" type="datetimeFigureOut">
               <a:rPr lang="sv-SE" smtClean="0"/>
-              <a:t>2020-08-26</a:t>
+              <a:t>2020-08-28</a:t>
             </a:fld>
             <a:endParaRPr lang="sv-SE"/>
           </a:p>
@@ -4421,7 +4421,7 @@
             <a:fld id="{B61BEF0D-F0BB-DE4B-95CE-6DB70DBA9567}" type="datetimeFigureOut">
               <a:rPr lang="en-US"/>
               <a:pPr/>
-              <a:t>8/26/2020</a:t>
+              <a:t>8/28/2020</a:t>
             </a:fld>
             <a:endParaRPr lang="en-US"/>
           </a:p>
@@ -4670,7 +4670,7 @@
           <a:p>
             <a:fld id="{C2231AF4-6FC1-4460-BBC9-D7CD0B6E11EF}" type="datetimeFigureOut">
               <a:rPr lang="sv-SE" smtClean="0"/>
-              <a:t>2020-08-26</a:t>
+              <a:t>2020-08-28</a:t>
             </a:fld>
             <a:endParaRPr lang="sv-SE"/>
           </a:p>
@@ -5082,7 +5082,7 @@
           <a:p>
             <a:fld id="{C2231AF4-6FC1-4460-BBC9-D7CD0B6E11EF}" type="datetimeFigureOut">
               <a:rPr lang="sv-SE" smtClean="0"/>
-              <a:t>2020-08-26</a:t>
+              <a:t>2020-08-28</a:t>
             </a:fld>
             <a:endParaRPr lang="sv-SE"/>
           </a:p>
@@ -5223,7 +5223,7 @@
           <a:p>
             <a:fld id="{C2231AF4-6FC1-4460-BBC9-D7CD0B6E11EF}" type="datetimeFigureOut">
               <a:rPr lang="sv-SE" smtClean="0"/>
-              <a:t>2020-08-26</a:t>
+              <a:t>2020-08-28</a:t>
             </a:fld>
             <a:endParaRPr lang="sv-SE"/>
           </a:p>
@@ -5336,7 +5336,7 @@
           <a:p>
             <a:fld id="{C2231AF4-6FC1-4460-BBC9-D7CD0B6E11EF}" type="datetimeFigureOut">
               <a:rPr lang="sv-SE" smtClean="0"/>
-              <a:t>2020-08-26</a:t>
+              <a:t>2020-08-28</a:t>
             </a:fld>
             <a:endParaRPr lang="sv-SE"/>
           </a:p>
@@ -5647,7 +5647,7 @@
           <a:p>
             <a:fld id="{C2231AF4-6FC1-4460-BBC9-D7CD0B6E11EF}" type="datetimeFigureOut">
               <a:rPr lang="sv-SE" smtClean="0"/>
-              <a:t>2020-08-26</a:t>
+              <a:t>2020-08-28</a:t>
             </a:fld>
             <a:endParaRPr lang="sv-SE"/>
           </a:p>
@@ -5935,7 +5935,7 @@
           <a:p>
             <a:fld id="{C2231AF4-6FC1-4460-BBC9-D7CD0B6E11EF}" type="datetimeFigureOut">
               <a:rPr lang="sv-SE" smtClean="0"/>
-              <a:t>2020-08-26</a:t>
+              <a:t>2020-08-28</a:t>
             </a:fld>
             <a:endParaRPr lang="sv-SE"/>
           </a:p>
@@ -6133,7 +6133,7 @@
           <a:p>
             <a:fld id="{C2231AF4-6FC1-4460-BBC9-D7CD0B6E11EF}" type="datetimeFigureOut">
               <a:rPr lang="sv-SE" smtClean="0"/>
-              <a:t>2020-08-26</a:t>
+              <a:t>2020-08-28</a:t>
             </a:fld>
             <a:endParaRPr lang="sv-SE"/>
           </a:p>
@@ -6341,7 +6341,7 @@
           <a:p>
             <a:fld id="{C2231AF4-6FC1-4460-BBC9-D7CD0B6E11EF}" type="datetimeFigureOut">
               <a:rPr lang="sv-SE" smtClean="0"/>
-              <a:t>2020-08-26</a:t>
+              <a:t>2020-08-28</a:t>
             </a:fld>
             <a:endParaRPr lang="sv-SE"/>
           </a:p>
@@ -6601,7 +6601,7 @@
             <a:fld id="{B61BEF0D-F0BB-DE4B-95CE-6DB70DBA9567}" type="datetimeFigureOut">
               <a:rPr lang="en-US"/>
               <a:pPr/>
-              <a:t>8/26/2020</a:t>
+              <a:t>8/28/2020</a:t>
             </a:fld>
             <a:endParaRPr lang="en-US"/>
           </a:p>
@@ -6829,7 +6829,7 @@
           <a:p>
             <a:fld id="{EB712588-04B1-427B-82EE-E8DB90309F08}" type="datetimeFigureOut">
               <a:rPr lang="en-US"/>
-              <a:t>8/26/2020</a:t>
+              <a:t>8/28/2020</a:t>
             </a:fld>
             <a:endParaRPr lang="en-US"/>
           </a:p>
@@ -7199,7 +7199,7 @@
             <a:fld id="{B61BEF0D-F0BB-DE4B-95CE-6DB70DBA9567}" type="datetimeFigureOut">
               <a:rPr lang="en-US"/>
               <a:pPr/>
-              <a:t>8/26/2020</a:t>
+              <a:t>8/28/2020</a:t>
             </a:fld>
             <a:endParaRPr lang="en-US"/>
           </a:p>
@@ -7319,7 +7319,7 @@
             <a:fld id="{B61BEF0D-F0BB-DE4B-95CE-6DB70DBA9567}" type="datetimeFigureOut">
               <a:rPr lang="en-US"/>
               <a:pPr/>
-              <a:t>8/26/2020</a:t>
+              <a:t>8/28/2020</a:t>
             </a:fld>
             <a:endParaRPr lang="en-US"/>
           </a:p>
@@ -7411,7 +7411,7 @@
             <a:fld id="{B61BEF0D-F0BB-DE4B-95CE-6DB70DBA9567}" type="datetimeFigureOut">
               <a:rPr lang="en-US"/>
               <a:pPr/>
-              <a:t>8/26/2020</a:t>
+              <a:t>8/28/2020</a:t>
             </a:fld>
             <a:endParaRPr lang="en-US"/>
           </a:p>
@@ -7662,7 +7662,7 @@
           <a:p>
             <a:fld id="{42A54C80-263E-416B-A8E0-580EDEADCBDC}" type="datetimeFigureOut">
               <a:rPr lang="en-US"/>
-              <a:t>8/26/2020</a:t>
+              <a:t>8/28/2020</a:t>
             </a:fld>
             <a:endParaRPr lang="en-US"/>
           </a:p>
@@ -7921,7 +7921,7 @@
             <a:fld id="{B61BEF0D-F0BB-DE4B-95CE-6DB70DBA9567}" type="datetimeFigureOut">
               <a:rPr lang="en-US"/>
               <a:pPr/>
-              <a:t>8/26/2020</a:t>
+              <a:t>8/28/2020</a:t>
             </a:fld>
             <a:endParaRPr lang="en-US"/>
           </a:p>
@@ -8146,7 +8146,7 @@
             <a:fld id="{B61BEF0D-F0BB-DE4B-95CE-6DB70DBA9567}" type="datetimeFigureOut">
               <a:rPr lang="en-US"/>
               <a:pPr/>
-              <a:t>8/26/2020</a:t>
+              <a:t>8/28/2020</a:t>
             </a:fld>
             <a:endParaRPr lang="en-US"/>
           </a:p>
@@ -8853,7 +8853,7 @@
           <a:p>
             <a:fld id="{C2231AF4-6FC1-4460-BBC9-D7CD0B6E11EF}" type="datetimeFigureOut">
               <a:rPr lang="sv-SE" smtClean="0"/>
-              <a:t>2020-08-26</a:t>
+              <a:t>2020-08-28</a:t>
             </a:fld>
             <a:endParaRPr lang="sv-SE"/>
           </a:p>
@@ -9298,8 +9298,13 @@
           <a:p>
             <a:r>
               <a:rPr lang="en-US" sz="3200" dirty="0"/>
-              <a:t>Statistics, an unreliable friend</a:t>
-            </a:r>
+              <a:t>Statistics, an </a:t>
+            </a:r>
+            <a:r>
+              <a:rPr lang="en-US" sz="3200"/>
+              <a:t>Unreliable Friend</a:t>
+            </a:r>
+            <a:endParaRPr lang="en-US" sz="3200" dirty="0"/>
           </a:p>
         </p:txBody>
       </p:sp>
@@ -12449,8 +12454,8 @@
           </a:extLst>
         </p:spPr>
       </p:pic>
-      <mc:AlternateContent xmlns:mc="http://schemas.openxmlformats.org/markup-compatibility/2006">
-        <mc:Choice xmlns:p14="http://schemas.microsoft.com/office/powerpoint/2010/main" Requires="p14">
+      <mc:AlternateContent xmlns:mc="http://schemas.openxmlformats.org/markup-compatibility/2006" xmlns:p14="http://schemas.microsoft.com/office/powerpoint/2010/main">
+        <mc:Choice Requires="p14">
           <p:contentPart p14:bwMode="auto" r:id="rId4">
             <p14:nvContentPartPr>
               <p14:cNvPr id="4" name="Pennanteckning 3">
@@ -12469,7 +12474,7 @@
             </p14:xfrm>
           </p:contentPart>
         </mc:Choice>
-        <mc:Fallback>
+        <mc:Fallback xmlns="">
           <p:pic>
             <p:nvPicPr>
               <p:cNvPr id="4" name="Pennanteckning 3">
@@ -12500,8 +12505,8 @@
           </p:pic>
         </mc:Fallback>
       </mc:AlternateContent>
-      <mc:AlternateContent xmlns:mc="http://schemas.openxmlformats.org/markup-compatibility/2006">
-        <mc:Choice xmlns:p14="http://schemas.microsoft.com/office/powerpoint/2010/main" Requires="p14">
+      <mc:AlternateContent xmlns:mc="http://schemas.openxmlformats.org/markup-compatibility/2006" xmlns:p14="http://schemas.microsoft.com/office/powerpoint/2010/main">
+        <mc:Choice Requires="p14">
           <p:contentPart p14:bwMode="auto" r:id="rId6">
             <p14:nvContentPartPr>
               <p14:cNvPr id="6" name="Pennanteckning 5">
@@ -12520,7 +12525,7 @@
             </p14:xfrm>
           </p:contentPart>
         </mc:Choice>
-        <mc:Fallback>
+        <mc:Fallback xmlns="">
           <p:pic>
             <p:nvPicPr>
               <p:cNvPr id="6" name="Pennanteckning 5">
@@ -12934,7 +12939,7 @@
             </a:r>
             <a:r>
               <a:rPr lang="sv-SE" dirty="0"/>
-              <a:t> at =&gt; I’m </a:t>
+              <a:t> at =&gt; DBA </a:t>
             </a:r>
             <a:r>
               <a:rPr lang="sv-SE" dirty="0" err="1"/>

</xml_diff>